<commit_message>
lab 2 slides modified
</commit_message>
<xml_diff>
--- a/Lab_slides/lab2/z_others/Presentation1.pptx
+++ b/Lab_slides/lab2/z_others/Presentation1.pptx
@@ -105,6 +105,11 @@
       </a:defRPr>
     </a:lvl9pPr>
   </p:defaultTextStyle>
+  <p:extLst>
+    <p:ext uri="{EFAFB233-063F-42B5-8137-9DF3F51BA10A}">
+      <p15:sldGuideLst xmlns:p15="http://schemas.microsoft.com/office/powerpoint/2012/main"/>
+    </p:ext>
+  </p:extLst>
 </p:presentation>
 </file>
 
@@ -255,7 +260,7 @@
           <a:p>
             <a:fld id="{C0F47887-44CE-0A47-805C-BA5290CEB516}" type="datetimeFigureOut">
               <a:rPr lang="en-US" smtClean="0"/>
-              <a:t>9/10/24</a:t>
+              <a:t>9/13/24</a:t>
             </a:fld>
             <a:endParaRPr lang="en-US"/>
           </a:p>
@@ -453,7 +458,7 @@
           <a:p>
             <a:fld id="{C0F47887-44CE-0A47-805C-BA5290CEB516}" type="datetimeFigureOut">
               <a:rPr lang="en-US" smtClean="0"/>
-              <a:t>9/10/24</a:t>
+              <a:t>9/13/24</a:t>
             </a:fld>
             <a:endParaRPr lang="en-US"/>
           </a:p>
@@ -661,7 +666,7 @@
           <a:p>
             <a:fld id="{C0F47887-44CE-0A47-805C-BA5290CEB516}" type="datetimeFigureOut">
               <a:rPr lang="en-US" smtClean="0"/>
-              <a:t>9/10/24</a:t>
+              <a:t>9/13/24</a:t>
             </a:fld>
             <a:endParaRPr lang="en-US"/>
           </a:p>
@@ -859,7 +864,7 @@
           <a:p>
             <a:fld id="{C0F47887-44CE-0A47-805C-BA5290CEB516}" type="datetimeFigureOut">
               <a:rPr lang="en-US" smtClean="0"/>
-              <a:t>9/10/24</a:t>
+              <a:t>9/13/24</a:t>
             </a:fld>
             <a:endParaRPr lang="en-US"/>
           </a:p>
@@ -1134,7 +1139,7 @@
           <a:p>
             <a:fld id="{C0F47887-44CE-0A47-805C-BA5290CEB516}" type="datetimeFigureOut">
               <a:rPr lang="en-US" smtClean="0"/>
-              <a:t>9/10/24</a:t>
+              <a:t>9/13/24</a:t>
             </a:fld>
             <a:endParaRPr lang="en-US"/>
           </a:p>
@@ -1399,7 +1404,7 @@
           <a:p>
             <a:fld id="{C0F47887-44CE-0A47-805C-BA5290CEB516}" type="datetimeFigureOut">
               <a:rPr lang="en-US" smtClean="0"/>
-              <a:t>9/10/24</a:t>
+              <a:t>9/13/24</a:t>
             </a:fld>
             <a:endParaRPr lang="en-US"/>
           </a:p>
@@ -1811,7 +1816,7 @@
           <a:p>
             <a:fld id="{C0F47887-44CE-0A47-805C-BA5290CEB516}" type="datetimeFigureOut">
               <a:rPr lang="en-US" smtClean="0"/>
-              <a:t>9/10/24</a:t>
+              <a:t>9/13/24</a:t>
             </a:fld>
             <a:endParaRPr lang="en-US"/>
           </a:p>
@@ -1952,7 +1957,7 @@
           <a:p>
             <a:fld id="{C0F47887-44CE-0A47-805C-BA5290CEB516}" type="datetimeFigureOut">
               <a:rPr lang="en-US" smtClean="0"/>
-              <a:t>9/10/24</a:t>
+              <a:t>9/13/24</a:t>
             </a:fld>
             <a:endParaRPr lang="en-US"/>
           </a:p>
@@ -2065,7 +2070,7 @@
           <a:p>
             <a:fld id="{C0F47887-44CE-0A47-805C-BA5290CEB516}" type="datetimeFigureOut">
               <a:rPr lang="en-US" smtClean="0"/>
-              <a:t>9/10/24</a:t>
+              <a:t>9/13/24</a:t>
             </a:fld>
             <a:endParaRPr lang="en-US"/>
           </a:p>
@@ -2376,7 +2381,7 @@
           <a:p>
             <a:fld id="{C0F47887-44CE-0A47-805C-BA5290CEB516}" type="datetimeFigureOut">
               <a:rPr lang="en-US" smtClean="0"/>
-              <a:t>9/10/24</a:t>
+              <a:t>9/13/24</a:t>
             </a:fld>
             <a:endParaRPr lang="en-US"/>
           </a:p>
@@ -2664,7 +2669,7 @@
           <a:p>
             <a:fld id="{C0F47887-44CE-0A47-805C-BA5290CEB516}" type="datetimeFigureOut">
               <a:rPr lang="en-US" smtClean="0"/>
-              <a:t>9/10/24</a:t>
+              <a:t>9/13/24</a:t>
             </a:fld>
             <a:endParaRPr lang="en-US"/>
           </a:p>
@@ -2905,7 +2910,7 @@
           <a:p>
             <a:fld id="{C0F47887-44CE-0A47-805C-BA5290CEB516}" type="datetimeFigureOut">
               <a:rPr lang="en-US" smtClean="0"/>
-              <a:t>9/10/24</a:t>
+              <a:t>9/13/24</a:t>
             </a:fld>
             <a:endParaRPr lang="en-US"/>
           </a:p>
@@ -3447,7 +3452,7 @@
         <p:grpSpPr>
           <a:xfrm>
             <a:off x="3032234" y="1455683"/>
-            <a:ext cx="5134304" cy="4030718"/>
+            <a:ext cx="5134304" cy="3536731"/>
             <a:chOff x="3032234" y="1455683"/>
             <a:chExt cx="5134304" cy="4030718"/>
           </a:xfrm>
@@ -3557,8 +3562,8 @@
           </p:nvSpPr>
           <p:spPr>
             <a:xfrm>
-              <a:off x="3699645" y="2248949"/>
-              <a:ext cx="4141076" cy="2554545"/>
+              <a:off x="3731176" y="2356972"/>
+              <a:ext cx="4141076" cy="2062103"/>
             </a:xfrm>
             <a:prstGeom prst="rect">
               <a:avLst/>
@@ -3580,12 +3585,6 @@
               <a:r>
                 <a:rPr lang="en-US" sz="3200" dirty="0"/>
                 <a:t>• Government policies</a:t>
-              </a:r>
-            </a:p>
-            <a:p>
-              <a:r>
-                <a:rPr lang="en-US" sz="3200" dirty="0"/>
-                <a:t>• Technology</a:t>
               </a:r>
             </a:p>
             <a:p>

</xml_diff>